<commit_message>
Added points to the dificulties
</commit_message>
<xml_diff>
--- a/Presentation.pptx
+++ b/Presentation.pptx
@@ -115,6 +115,11 @@
       </a:defRPr>
     </a:lvl9pPr>
   </p:defaultTextStyle>
+  <p:extLst>
+    <p:ext uri="{EFAFB233-063F-42B5-8137-9DF3F51BA10A}">
+      <p15:sldGuideLst xmlns:p15="http://schemas.microsoft.com/office/powerpoint/2012/main"/>
+    </p:ext>
+  </p:extLst>
 </p:presentation>
 </file>
 
@@ -7502,22 +7507,37 @@
           <a:p>
             <a:pPr fontAlgn="base"/>
             <a:r>
+              <a:rPr lang="pt-PT" dirty="0"/>
+              <a:t>No início do trabalho a decidir qual seria a melhor estrutura de classes, onde armazenar os vetores.</a:t>
+            </a:r>
+          </a:p>
+          <a:p>
+            <a:pPr fontAlgn="base"/>
+            <a:r>
+              <a:rPr lang="pt-PT" dirty="0"/>
+              <a:t>Tirar o maior partido de polimorfismo possível.</a:t>
+            </a:r>
+          </a:p>
+          <a:p>
+            <a:pPr fontAlgn="base"/>
+            <a:r>
+              <a:rPr lang="pt-PT" dirty="0"/>
+              <a:t>Arranjar a melhor forma de organizar os </a:t>
+            </a:r>
+            <a:r>
+              <a:rPr lang="pt-PT" dirty="0" err="1"/>
+              <a:t>vectores</a:t>
+            </a:r>
+            <a:r>
+              <a:rPr lang="pt-PT" dirty="0"/>
+              <a:t>;</a:t>
+            </a:r>
+          </a:p>
+          <a:p>
+            <a:pPr fontAlgn="base"/>
+            <a:r>
               <a:rPr lang="pt-PT"/>
-              <a:t>No início do trabalho a decidir qual seria a melhor estrutura de classes, onde armazenar os vetores.</a:t>
-            </a:r>
-          </a:p>
-          <a:p>
-            <a:pPr fontAlgn="base"/>
-            <a:r>
-              <a:rPr lang="pt-PT"/>
-              <a:t>Tirar o maior partido de polimorfismo possível.</a:t>
-            </a:r>
-          </a:p>
-          <a:p>
-            <a:pPr fontAlgn="base"/>
-            <a:r>
-              <a:rPr lang="pt-PT"/>
-              <a:t>...</a:t>
+              <a:t>Criar uma forma de usar o mínimo de funções no menu.</a:t>
             </a:r>
           </a:p>
         </p:txBody>

</xml_diff>